<commit_message>
Se agrego link del repositorio
</commit_message>
<xml_diff>
--- a/Doc.Presentacion/proyecto documento.pptx
+++ b/Doc.Presentacion/proyecto documento.pptx
@@ -41567,7 +41567,7 @@
             </a:pPr>
             <a:r>
               <a:rPr lang="en" dirty="0"/>
-              <a:t>Bocanegra Hugo Enrique</a:t>
+              <a:t>Bocanegra Rodriguez Hugo Enrique</a:t>
             </a:r>
           </a:p>
           <a:p>
@@ -47229,7 +47229,7 @@
         </p:nvSpPr>
         <p:spPr>
           <a:xfrm>
-            <a:off x="720000" y="445025"/>
+            <a:off x="715100" y="603165"/>
             <a:ext cx="7704000" cy="572700"/>
           </a:xfrm>
           <a:prstGeom prst="rect">
@@ -47252,64 +47252,14 @@
               <a:buNone/>
             </a:pPr>
             <a:r>
-              <a:rPr lang="en"/>
-              <a:t>CONTENTS OF THIS TEMPLATE</a:t>
+              <a:rPr lang="es-MX" dirty="0"/>
+              <a:t>C</a:t>
             </a:r>
-            <a:endParaRPr/>
-          </a:p>
-        </p:txBody>
-      </p:sp>
-      <p:sp>
-        <p:nvSpPr>
-          <p:cNvPr id="1341" name="Google Shape;1341;p29"/>
-          <p:cNvSpPr txBox="1">
-            <a:spLocks noGrp="1"/>
-          </p:cNvSpPr>
-          <p:nvPr>
-            <p:ph type="body" idx="1"/>
-          </p:nvPr>
-        </p:nvSpPr>
-        <p:spPr>
-          <a:xfrm>
-            <a:off x="720000" y="1017725"/>
-            <a:ext cx="7704000" cy="395400"/>
-          </a:xfrm>
-          <a:prstGeom prst="rect">
-            <a:avLst/>
-          </a:prstGeom>
-        </p:spPr>
-        <p:txBody>
-          <a:bodyPr spcFirstLastPara="1" wrap="square" lIns="91425" tIns="91425" rIns="91425" bIns="91425" anchor="t" anchorCtr="0">
-            <a:noAutofit/>
-          </a:bodyPr>
-          <a:lstStyle/>
-          <a:p>
-            <a:pPr marL="0" lvl="0" indent="0" algn="l" rtl="0">
-              <a:spcBef>
-                <a:spcPts val="0"/>
-              </a:spcBef>
-              <a:spcAft>
-                <a:spcPts val="0"/>
-              </a:spcAft>
-              <a:buNone/>
-            </a:pPr>
             <a:r>
-              <a:rPr lang="en"/>
-              <a:t>You can delete this slide when you’re done editing the presentation</a:t>
+              <a:rPr lang="en" dirty="0"/>
+              <a:t>omponentes importantes a usar</a:t>
             </a:r>
-            <a:endParaRPr/>
-          </a:p>
-          <a:p>
-            <a:pPr marL="0" lvl="0" indent="0" algn="l" rtl="0">
-              <a:spcBef>
-                <a:spcPts val="0"/>
-              </a:spcBef>
-              <a:spcAft>
-                <a:spcPts val="0"/>
-              </a:spcAft>
-              <a:buNone/>
-            </a:pPr>
-            <a:endParaRPr/>
+            <a:endParaRPr dirty="0"/>
           </a:p>
         </p:txBody>
       </p:sp>
@@ -53998,7 +53948,7 @@
             </a:pPr>
             <a:r>
               <a:rPr lang="en" dirty="0"/>
-              <a:t>-</a:t>
+              <a:t>- Una idea sobre un prototitpo de casa domotica o automatizada en su mayoria, con la cual ayudara a miles de personas como adultos mayores o personal de trabajo lejos en casa.</a:t>
             </a:r>
             <a:endParaRPr dirty="0"/>
           </a:p>
@@ -54104,7 +54054,7 @@
         </p:nvSpPr>
         <p:spPr>
           <a:xfrm>
-            <a:off x="2576800" y="1576025"/>
+            <a:off x="2569656" y="1568881"/>
             <a:ext cx="681900" cy="681900"/>
           </a:xfrm>
           <a:prstGeom prst="rect">
@@ -54171,10 +54121,10 @@
               <a:buNone/>
             </a:pPr>
             <a:r>
-              <a:rPr lang="en"/>
-              <a:t>OUR GOALS</a:t>
+              <a:rPr lang="en" dirty="0"/>
+              <a:t>¿Cómo?</a:t>
             </a:r>
-            <a:endParaRPr/>
+            <a:endParaRPr dirty="0"/>
           </a:p>
         </p:txBody>
       </p:sp>

</xml_diff>